<commit_message>
feat(main): Completed Big Query and JupyterLab Analysis
</commit_message>
<xml_diff>
--- a/docs/ccbd_project_presentation.pptx
+++ b/docs/ccbd_project_presentation.pptx
@@ -5,10 +5,10 @@
     <p:sldMasterId id="2147483648" r:id="rId4"/>
   </p:sldMasterIdLst>
   <p:notesMasterIdLst>
-    <p:notesMasterId r:id="rId23"/>
+    <p:notesMasterId r:id="rId25"/>
   </p:notesMasterIdLst>
   <p:handoutMasterIdLst>
-    <p:handoutMasterId r:id="rId24"/>
+    <p:handoutMasterId r:id="rId26"/>
   </p:handoutMasterIdLst>
   <p:sldIdLst>
     <p:sldId id="256" r:id="rId5"/>
@@ -29,6 +29,8 @@
     <p:sldId id="290" r:id="rId20"/>
     <p:sldId id="291" r:id="rId21"/>
     <p:sldId id="292" r:id="rId22"/>
+    <p:sldId id="294" r:id="rId23"/>
+    <p:sldId id="293" r:id="rId24"/>
   </p:sldIdLst>
   <p:sldSz cx="12192000" cy="6858000"/>
   <p:notesSz cx="6858000" cy="9144000"/>
@@ -260,7 +262,7 @@
           <a:p>
             <a:fld id="{058ABBF3-49A8-4B3F-9773-22E67695BB12}" type="datetimeFigureOut">
               <a:rPr lang="en-US" smtClean="0"/>
-              <a:t>6/1/2025</a:t>
+              <a:t>6/2/2025</a:t>
             </a:fld>
             <a:endParaRPr lang="en-US" dirty="0"/>
           </a:p>
@@ -437,7 +439,7 @@
           <a:p>
             <a:fld id="{F44AAC2B-A50D-4386-849A-6B59FB991B4C}" type="datetimeFigureOut">
               <a:rPr lang="en-US" smtClean="0"/>
-              <a:t>6/1/2025</a:t>
+              <a:t>6/2/2025</a:t>
             </a:fld>
             <a:endParaRPr lang="en-US" dirty="0"/>
           </a:p>
@@ -1271,6 +1273,114 @@
     <p:extLst>
       <p:ext uri="{BB962C8B-B14F-4D97-AF65-F5344CB8AC3E}">
         <p14:creationId xmlns:p14="http://schemas.microsoft.com/office/powerpoint/2010/main" val="1973635160"/>
+      </p:ext>
+    </p:extLst>
+  </p:cSld>
+  <p:clrMapOvr>
+    <a:masterClrMapping/>
+  </p:clrMapOvr>
+</p:notes>
+</file>
+
+<file path=ppt/notesSlides/notesSlide7.xml><?xml version="1.0" encoding="utf-8"?>
+<p:notes xmlns:a="http://schemas.openxmlformats.org/drawingml/2006/main" xmlns:r="http://schemas.openxmlformats.org/officeDocument/2006/relationships" xmlns:p="http://schemas.openxmlformats.org/presentationml/2006/main">
+  <p:cSld>
+    <p:spTree>
+      <p:nvGrpSpPr>
+        <p:cNvPr id="1" name="">
+          <a:extLst>
+            <a:ext uri="{FF2B5EF4-FFF2-40B4-BE49-F238E27FC236}">
+              <a16:creationId xmlns:a16="http://schemas.microsoft.com/office/drawing/2014/main" id="{97EAE42C-D4FF-485B-AB4B-6D92E4158F14}"/>
+            </a:ext>
+          </a:extLst>
+        </p:cNvPr>
+        <p:cNvGrpSpPr/>
+        <p:nvPr/>
+      </p:nvGrpSpPr>
+      <p:grpSpPr>
+        <a:xfrm>
+          <a:off x="0" y="0"/>
+          <a:ext cx="0" cy="0"/>
+          <a:chOff x="0" y="0"/>
+          <a:chExt cx="0" cy="0"/>
+        </a:xfrm>
+      </p:grpSpPr>
+      <p:sp>
+        <p:nvSpPr>
+          <p:cNvPr id="2" name="Slide Image Placeholder 1">
+            <a:extLst>
+              <a:ext uri="{FF2B5EF4-FFF2-40B4-BE49-F238E27FC236}">
+                <a16:creationId xmlns:a16="http://schemas.microsoft.com/office/drawing/2014/main" id="{D9AC9590-042C-770E-9815-7CA2B1D2D131}"/>
+              </a:ext>
+            </a:extLst>
+          </p:cNvPr>
+          <p:cNvSpPr>
+            <a:spLocks noGrp="1" noRot="1" noChangeAspect="1"/>
+          </p:cNvSpPr>
+          <p:nvPr>
+            <p:ph type="sldImg"/>
+          </p:nvPr>
+        </p:nvSpPr>
+        <p:spPr/>
+      </p:sp>
+      <p:sp>
+        <p:nvSpPr>
+          <p:cNvPr id="3" name="Notes Placeholder 2">
+            <a:extLst>
+              <a:ext uri="{FF2B5EF4-FFF2-40B4-BE49-F238E27FC236}">
+                <a16:creationId xmlns:a16="http://schemas.microsoft.com/office/drawing/2014/main" id="{0B3AA7B1-F114-5864-F36F-142C91B351CB}"/>
+              </a:ext>
+            </a:extLst>
+          </p:cNvPr>
+          <p:cNvSpPr>
+            <a:spLocks noGrp="1"/>
+          </p:cNvSpPr>
+          <p:nvPr>
+            <p:ph type="body" idx="1"/>
+          </p:nvPr>
+        </p:nvSpPr>
+        <p:spPr/>
+        <p:txBody>
+          <a:bodyPr/>
+          <a:lstStyle/>
+          <a:p>
+            <a:endParaRPr lang="en-US"/>
+          </a:p>
+        </p:txBody>
+      </p:sp>
+      <p:sp>
+        <p:nvSpPr>
+          <p:cNvPr id="4" name="Slide Number Placeholder 3">
+            <a:extLst>
+              <a:ext uri="{FF2B5EF4-FFF2-40B4-BE49-F238E27FC236}">
+                <a16:creationId xmlns:a16="http://schemas.microsoft.com/office/drawing/2014/main" id="{EBCD8A66-56A5-1E11-2206-86B88013A4B4}"/>
+              </a:ext>
+            </a:extLst>
+          </p:cNvPr>
+          <p:cNvSpPr>
+            <a:spLocks noGrp="1"/>
+          </p:cNvSpPr>
+          <p:nvPr>
+            <p:ph type="sldNum" sz="quarter" idx="5"/>
+          </p:nvPr>
+        </p:nvSpPr>
+        <p:spPr/>
+        <p:txBody>
+          <a:bodyPr/>
+          <a:lstStyle/>
+          <a:p>
+            <a:fld id="{10895658-EA1F-4910-80AB-4DA76E167475}" type="slidenum">
+              <a:rPr lang="en-US" smtClean="0"/>
+              <a:t>20</a:t>
+            </a:fld>
+            <a:endParaRPr lang="en-US" dirty="0"/>
+          </a:p>
+        </p:txBody>
+      </p:sp>
+    </p:spTree>
+    <p:extLst>
+      <p:ext uri="{BB962C8B-B14F-4D97-AF65-F5344CB8AC3E}">
+        <p14:creationId xmlns:p14="http://schemas.microsoft.com/office/powerpoint/2010/main" val="133094540"/>
       </p:ext>
     </p:extLst>
   </p:cSld>
@@ -21991,6 +22101,96 @@
 </p:sld>
 </file>
 
+<file path=ppt/slides/slide19.xml><?xml version="1.0" encoding="utf-8"?>
+<p:sld xmlns:a="http://schemas.openxmlformats.org/drawingml/2006/main" xmlns:r="http://schemas.openxmlformats.org/officeDocument/2006/relationships" xmlns:p="http://schemas.openxmlformats.org/presentationml/2006/main">
+  <p:cSld>
+    <p:spTree>
+      <p:nvGrpSpPr>
+        <p:cNvPr id="1" name=""/>
+        <p:cNvGrpSpPr/>
+        <p:nvPr/>
+      </p:nvGrpSpPr>
+      <p:grpSpPr>
+        <a:xfrm>
+          <a:off x="0" y="0"/>
+          <a:ext cx="0" cy="0"/>
+          <a:chOff x="0" y="0"/>
+          <a:chExt cx="0" cy="0"/>
+        </a:xfrm>
+      </p:grpSpPr>
+      <p:sp>
+        <p:nvSpPr>
+          <p:cNvPr id="3" name="Table Placeholder 2">
+            <a:extLst>
+              <a:ext uri="{FF2B5EF4-FFF2-40B4-BE49-F238E27FC236}">
+                <a16:creationId xmlns:a16="http://schemas.microsoft.com/office/drawing/2014/main" id="{36ACCA12-4FFB-1015-01B3-C7C4CAEC2230}"/>
+              </a:ext>
+            </a:extLst>
+          </p:cNvPr>
+          <p:cNvSpPr>
+            <a:spLocks noGrp="1"/>
+          </p:cNvSpPr>
+          <p:nvPr>
+            <p:ph type="tbl" sz="quarter" idx="13"/>
+          </p:nvPr>
+        </p:nvSpPr>
+        <p:spPr>
+          <a:xfrm>
+            <a:off x="762000" y="597159"/>
+            <a:ext cx="10665845" cy="5498839"/>
+          </a:xfrm>
+        </p:spPr>
+        <p:txBody>
+          <a:bodyPr/>
+          <a:lstStyle/>
+          <a:p>
+            <a:endParaRPr lang="en-US"/>
+          </a:p>
+        </p:txBody>
+      </p:sp>
+      <p:sp>
+        <p:nvSpPr>
+          <p:cNvPr id="4" name="Slide Number Placeholder 3">
+            <a:extLst>
+              <a:ext uri="{FF2B5EF4-FFF2-40B4-BE49-F238E27FC236}">
+                <a16:creationId xmlns:a16="http://schemas.microsoft.com/office/drawing/2014/main" id="{74D16971-206D-45E9-8B42-9BC1AFC5D48A}"/>
+              </a:ext>
+            </a:extLst>
+          </p:cNvPr>
+          <p:cNvSpPr>
+            <a:spLocks noGrp="1"/>
+          </p:cNvSpPr>
+          <p:nvPr>
+            <p:ph type="sldNum" sz="quarter" idx="12"/>
+          </p:nvPr>
+        </p:nvSpPr>
+        <p:spPr/>
+        <p:txBody>
+          <a:bodyPr/>
+          <a:lstStyle/>
+          <a:p>
+            <a:fld id="{B5CEABB6-07DC-46E8-9B57-56EC44A396E5}" type="slidenum">
+              <a:rPr lang="en-US" smtClean="0"/>
+              <a:pPr/>
+              <a:t>19</a:t>
+            </a:fld>
+            <a:endParaRPr lang="en-US" dirty="0"/>
+          </a:p>
+        </p:txBody>
+      </p:sp>
+    </p:spTree>
+    <p:extLst>
+      <p:ext uri="{BB962C8B-B14F-4D97-AF65-F5344CB8AC3E}">
+        <p14:creationId xmlns:p14="http://schemas.microsoft.com/office/powerpoint/2010/main" val="1211781274"/>
+      </p:ext>
+    </p:extLst>
+  </p:cSld>
+  <p:clrMapOvr>
+    <a:masterClrMapping/>
+  </p:clrMapOvr>
+</p:sld>
+</file>
+
 <file path=ppt/slides/slide2.xml><?xml version="1.0" encoding="utf-8"?>
 <p:sld xmlns:a="http://schemas.openxmlformats.org/drawingml/2006/main" xmlns:r="http://schemas.openxmlformats.org/officeDocument/2006/relationships" xmlns:p="http://schemas.openxmlformats.org/presentationml/2006/main">
   <p:cSld>
@@ -22211,6 +22411,212 @@
     <p:extLst>
       <p:ext uri="{BB962C8B-B14F-4D97-AF65-F5344CB8AC3E}">
         <p14:creationId xmlns:p14="http://schemas.microsoft.com/office/powerpoint/2010/main" val="2243494996"/>
+      </p:ext>
+    </p:extLst>
+  </p:cSld>
+  <p:clrMapOvr>
+    <a:masterClrMapping/>
+  </p:clrMapOvr>
+</p:sld>
+</file>
+
+<file path=ppt/slides/slide20.xml><?xml version="1.0" encoding="utf-8"?>
+<p:sld xmlns:a="http://schemas.openxmlformats.org/drawingml/2006/main" xmlns:r="http://schemas.openxmlformats.org/officeDocument/2006/relationships" xmlns:p="http://schemas.openxmlformats.org/presentationml/2006/main">
+  <p:cSld>
+    <p:spTree>
+      <p:nvGrpSpPr>
+        <p:cNvPr id="1" name="">
+          <a:extLst>
+            <a:ext uri="{FF2B5EF4-FFF2-40B4-BE49-F238E27FC236}">
+              <a16:creationId xmlns:a16="http://schemas.microsoft.com/office/drawing/2014/main" id="{AF3675C5-1B74-2E63-4A91-E8E58C409867}"/>
+            </a:ext>
+          </a:extLst>
+        </p:cNvPr>
+        <p:cNvGrpSpPr/>
+        <p:nvPr/>
+      </p:nvGrpSpPr>
+      <p:grpSpPr>
+        <a:xfrm>
+          <a:off x="0" y="0"/>
+          <a:ext cx="0" cy="0"/>
+          <a:chOff x="0" y="0"/>
+          <a:chExt cx="0" cy="0"/>
+        </a:xfrm>
+      </p:grpSpPr>
+      <p:sp>
+        <p:nvSpPr>
+          <p:cNvPr id="2" name="Title 1">
+            <a:extLst>
+              <a:ext uri="{FF2B5EF4-FFF2-40B4-BE49-F238E27FC236}">
+                <a16:creationId xmlns:a16="http://schemas.microsoft.com/office/drawing/2014/main" id="{A40686A0-7B48-5DB4-6029-AABA2537CD86}"/>
+              </a:ext>
+            </a:extLst>
+          </p:cNvPr>
+          <p:cNvSpPr>
+            <a:spLocks noGrp="1"/>
+          </p:cNvSpPr>
+          <p:nvPr>
+            <p:ph type="ctrTitle"/>
+          </p:nvPr>
+        </p:nvSpPr>
+        <p:spPr>
+          <a:xfrm>
+            <a:off x="3828362" y="236262"/>
+            <a:ext cx="8152143" cy="2472612"/>
+          </a:xfrm>
+        </p:spPr>
+        <p:txBody>
+          <a:bodyPr>
+            <a:normAutofit/>
+          </a:bodyPr>
+          <a:lstStyle/>
+          <a:p>
+            <a:r>
+              <a:rPr lang="en-US" dirty="0"/>
+              <a:t>Data analysis with </a:t>
+            </a:r>
+            <a:r>
+              <a:rPr lang="en-US" dirty="0" err="1"/>
+              <a:t>databricks</a:t>
+            </a:r>
+            <a:endParaRPr lang="en-US" dirty="0"/>
+          </a:p>
+        </p:txBody>
+      </p:sp>
+      <p:sp>
+        <p:nvSpPr>
+          <p:cNvPr id="31" name="Oval 30">
+            <a:extLst>
+              <a:ext uri="{FF2B5EF4-FFF2-40B4-BE49-F238E27FC236}">
+                <a16:creationId xmlns:a16="http://schemas.microsoft.com/office/drawing/2014/main" id="{11C162EF-05D6-32B7-5831-189122B19F28}"/>
+              </a:ext>
+              <a:ext uri="{C183D7F6-B498-43B3-948B-1728B52AA6E4}">
+                <adec:decorative xmlns:adec="http://schemas.microsoft.com/office/drawing/2017/decorative" val="1"/>
+              </a:ext>
+            </a:extLst>
+          </p:cNvPr>
+          <p:cNvSpPr/>
+          <p:nvPr/>
+        </p:nvSpPr>
+        <p:spPr>
+          <a:xfrm>
+            <a:off x="3903349" y="4646277"/>
+            <a:ext cx="274320" cy="274320"/>
+          </a:xfrm>
+          <a:prstGeom prst="ellipse">
+            <a:avLst/>
+          </a:prstGeom>
+          <a:solidFill>
+            <a:schemeClr val="bg1"/>
+          </a:solidFill>
+          <a:ln>
+            <a:noFill/>
+          </a:ln>
+        </p:spPr>
+        <p:style>
+          <a:lnRef idx="2">
+            <a:schemeClr val="accent1">
+              <a:shade val="50000"/>
+            </a:schemeClr>
+          </a:lnRef>
+          <a:fillRef idx="1">
+            <a:schemeClr val="accent1"/>
+          </a:fillRef>
+          <a:effectRef idx="0">
+            <a:schemeClr val="accent1"/>
+          </a:effectRef>
+          <a:fontRef idx="minor">
+            <a:schemeClr val="lt1"/>
+          </a:fontRef>
+        </p:style>
+        <p:txBody>
+          <a:bodyPr rtlCol="0" anchor="ctr"/>
+          <a:lstStyle/>
+          <a:p>
+            <a:pPr algn="ctr"/>
+            <a:endParaRPr lang="en-US" dirty="0"/>
+          </a:p>
+        </p:txBody>
+      </p:sp>
+      <p:cxnSp>
+        <p:nvCxnSpPr>
+          <p:cNvPr id="32" name="Straight Connector 31">
+            <a:extLst>
+              <a:ext uri="{FF2B5EF4-FFF2-40B4-BE49-F238E27FC236}">
+                <a16:creationId xmlns:a16="http://schemas.microsoft.com/office/drawing/2014/main" id="{BEAC9EB8-9B74-5BAE-8B64-AF31E1EB83EE}"/>
+              </a:ext>
+              <a:ext uri="{C183D7F6-B498-43B3-948B-1728B52AA6E4}">
+                <adec:decorative xmlns:adec="http://schemas.microsoft.com/office/drawing/2017/decorative" val="1"/>
+              </a:ext>
+            </a:extLst>
+          </p:cNvPr>
+          <p:cNvCxnSpPr>
+            <a:cxnSpLocks/>
+          </p:cNvCxnSpPr>
+          <p:nvPr/>
+        </p:nvCxnSpPr>
+        <p:spPr>
+          <a:xfrm>
+            <a:off x="4062984" y="4809555"/>
+            <a:ext cx="0" cy="0"/>
+          </a:xfrm>
+          <a:prstGeom prst="line">
+            <a:avLst/>
+          </a:prstGeom>
+          <a:ln w="50800">
+            <a:solidFill>
+              <a:schemeClr val="bg1"/>
+            </a:solidFill>
+          </a:ln>
+        </p:spPr>
+        <p:style>
+          <a:lnRef idx="1">
+            <a:schemeClr val="accent1"/>
+          </a:lnRef>
+          <a:fillRef idx="0">
+            <a:schemeClr val="accent1"/>
+          </a:fillRef>
+          <a:effectRef idx="0">
+            <a:schemeClr val="accent1"/>
+          </a:effectRef>
+          <a:fontRef idx="minor">
+            <a:schemeClr val="tx1"/>
+          </a:fontRef>
+        </p:style>
+      </p:cxnSp>
+      <p:pic>
+        <p:nvPicPr>
+          <p:cNvPr id="4" name="Picture 3" descr="A screenshot of a computer screen&#10;&#10;AI-generated content may be incorrect.">
+            <a:extLst>
+              <a:ext uri="{FF2B5EF4-FFF2-40B4-BE49-F238E27FC236}">
+                <a16:creationId xmlns:a16="http://schemas.microsoft.com/office/drawing/2014/main" id="{8B98CCA7-F453-9923-B4E2-B9ABC5B7101A}"/>
+              </a:ext>
+            </a:extLst>
+          </p:cNvPr>
+          <p:cNvPicPr>
+            <a:picLocks noChangeAspect="1"/>
+          </p:cNvPicPr>
+          <p:nvPr/>
+        </p:nvPicPr>
+        <p:blipFill>
+          <a:blip r:embed="rId3"/>
+          <a:srcRect r="24"/>
+          <a:stretch/>
+        </p:blipFill>
+        <p:spPr>
+          <a:xfrm>
+            <a:off x="0" y="0"/>
+            <a:ext cx="8266922" cy="6858000"/>
+          </a:xfrm>
+          <a:prstGeom prst="rtTriangle">
+            <a:avLst/>
+          </a:prstGeom>
+        </p:spPr>
+      </p:pic>
+    </p:spTree>
+    <p:extLst>
+      <p:ext uri="{BB962C8B-B14F-4D97-AF65-F5344CB8AC3E}">
+        <p14:creationId xmlns:p14="http://schemas.microsoft.com/office/powerpoint/2010/main" val="3723270126"/>
       </p:ext>
     </p:extLst>
   </p:cSld>
@@ -24433,6 +24839,15 @@
 </file>
 
 <file path=customXml/item1.xml><?xml version="1.0" encoding="utf-8"?>
+<?mso-contentType ?>
+<FormTemplates xmlns="http://schemas.microsoft.com/sharepoint/v3/contenttype/forms">
+  <Display>DocumentLibraryForm</Display>
+  <Edit>DocumentLibraryForm</Edit>
+  <New>DocumentLibraryForm</New>
+</FormTemplates>
+</file>
+
+<file path=customXml/item2.xml><?xml version="1.0" encoding="utf-8"?>
 <p:properties xmlns:p="http://schemas.microsoft.com/office/2006/metadata/properties" xmlns:xsi="http://www.w3.org/2001/XMLSchema-instance" xmlns:pc="http://schemas.microsoft.com/office/infopath/2007/PartnerControls">
   <documentManagement>
     <Background xmlns="71af3243-3dd4-4a8d-8c0d-dd76da1f02a5">false</Background>
@@ -24450,15 +24865,6 @@
     <MediaServiceKeyPoints xmlns="71af3243-3dd4-4a8d-8c0d-dd76da1f02a5" xsi:nil="true"/>
   </documentManagement>
 </p:properties>
-</file>
-
-<file path=customXml/item2.xml><?xml version="1.0" encoding="utf-8"?>
-<?mso-contentType ?>
-<FormTemplates xmlns="http://schemas.microsoft.com/sharepoint/v3/contenttype/forms">
-  <Display>DocumentLibraryForm</Display>
-  <Edit>DocumentLibraryForm</Edit>
-  <New>DocumentLibraryForm</New>
-</FormTemplates>
 </file>
 
 <file path=customXml/item3.xml><?xml version="1.0" encoding="utf-8"?>
@@ -24774,6 +25180,14 @@
 </file>
 
 <file path=customXml/itemProps1.xml><?xml version="1.0" encoding="utf-8"?>
+<ds:datastoreItem xmlns:ds="http://schemas.openxmlformats.org/officeDocument/2006/customXml" ds:itemID="{8451406B-581B-4C29-A833-E33D8A6AB075}">
+  <ds:schemaRefs>
+    <ds:schemaRef ds:uri="http://schemas.microsoft.com/sharepoint/v3/contenttype/forms"/>
+  </ds:schemaRefs>
+</ds:datastoreItem>
+</file>
+
+<file path=customXml/itemProps2.xml><?xml version="1.0" encoding="utf-8"?>
 <ds:datastoreItem xmlns:ds="http://schemas.openxmlformats.org/officeDocument/2006/customXml" ds:itemID="{0F65614A-92F9-4391-AC3D-F3F5B0704F99}">
   <ds:schemaRefs>
     <ds:schemaRef ds:uri="http://schemas.microsoft.com/office/2006/metadata/properties"/>
@@ -24781,14 +25195,6 @@
     <ds:schemaRef ds:uri="71af3243-3dd4-4a8d-8c0d-dd76da1f02a5"/>
     <ds:schemaRef ds:uri="http://schemas.microsoft.com/sharepoint/v3"/>
     <ds:schemaRef ds:uri="230e9df3-be65-4c73-a93b-d1236ebd677e"/>
-  </ds:schemaRefs>
-</ds:datastoreItem>
-</file>
-
-<file path=customXml/itemProps2.xml><?xml version="1.0" encoding="utf-8"?>
-<ds:datastoreItem xmlns:ds="http://schemas.openxmlformats.org/officeDocument/2006/customXml" ds:itemID="{8451406B-581B-4C29-A833-E33D8A6AB075}">
-  <ds:schemaRefs>
-    <ds:schemaRef ds:uri="http://schemas.microsoft.com/sharepoint/v3/contenttype/forms"/>
   </ds:schemaRefs>
 </ds:datastoreItem>
 </file>

</xml_diff>

<commit_message>
feat(main): Completed Databricks notebook and polished jupyter notebook
</commit_message>
<xml_diff>
--- a/docs/ccbd_project_presentation.pptx
+++ b/docs/ccbd_project_presentation.pptx
@@ -267,7 +267,7 @@
           <a:p>
             <a:fld id="{058ABBF3-49A8-4B3F-9773-22E67695BB12}" type="datetimeFigureOut">
               <a:rPr lang="en-US" smtClean="0"/>
-              <a:t>6/4/2025</a:t>
+              <a:t>6/12/2025</a:t>
             </a:fld>
             <a:endParaRPr lang="en-US" dirty="0"/>
           </a:p>
@@ -444,7 +444,7 @@
           <a:p>
             <a:fld id="{F44AAC2B-A50D-4386-849A-6B59FB991B4C}" type="datetimeFigureOut">
               <a:rPr lang="en-US" smtClean="0"/>
-              <a:t>6/4/2025</a:t>
+              <a:t>6/11/2025</a:t>
             </a:fld>
             <a:endParaRPr lang="en-US" dirty="0"/>
           </a:p>
@@ -23905,36 +23905,6 @@
       </p:grpSpPr>
       <p:sp>
         <p:nvSpPr>
-          <p:cNvPr id="3" name="Table Placeholder 2">
-            <a:extLst>
-              <a:ext uri="{FF2B5EF4-FFF2-40B4-BE49-F238E27FC236}">
-                <a16:creationId xmlns:a16="http://schemas.microsoft.com/office/drawing/2014/main" id="{B4C0A647-AB7A-A58B-DCEB-DA5A8687EFE0}"/>
-              </a:ext>
-            </a:extLst>
-          </p:cNvPr>
-          <p:cNvSpPr>
-            <a:spLocks noGrp="1"/>
-          </p:cNvSpPr>
-          <p:nvPr>
-            <p:ph type="tbl" sz="quarter" idx="13"/>
-          </p:nvPr>
-        </p:nvSpPr>
-        <p:spPr>
-          <a:xfrm>
-            <a:off x="762000" y="709127"/>
-            <a:ext cx="10665845" cy="5368210"/>
-          </a:xfrm>
-        </p:spPr>
-        <p:txBody>
-          <a:bodyPr/>
-          <a:lstStyle/>
-          <a:p>
-            <a:endParaRPr lang="en-US"/>
-          </a:p>
-        </p:txBody>
-      </p:sp>
-      <p:sp>
-        <p:nvSpPr>
           <p:cNvPr id="4" name="Slide Number Placeholder 3">
             <a:extLst>
               <a:ext uri="{FF2B5EF4-FFF2-40B4-BE49-F238E27FC236}">
@@ -23960,6 +23930,41 @@
               <a:t>25</a:t>
             </a:fld>
             <a:endParaRPr lang="en-US" dirty="0"/>
+          </a:p>
+        </p:txBody>
+      </p:sp>
+      <p:sp>
+        <p:nvSpPr>
+          <p:cNvPr id="2" name="TextBox 1">
+            <a:extLst>
+              <a:ext uri="{FF2B5EF4-FFF2-40B4-BE49-F238E27FC236}">
+                <a16:creationId xmlns:a16="http://schemas.microsoft.com/office/drawing/2014/main" id="{3A14CF77-1C0F-688A-728F-4922A1103E39}"/>
+              </a:ext>
+            </a:extLst>
+          </p:cNvPr>
+          <p:cNvSpPr txBox="1"/>
+          <p:nvPr/>
+        </p:nvSpPr>
+        <p:spPr>
+          <a:xfrm>
+            <a:off x="4462091" y="335902"/>
+            <a:ext cx="3267818" cy="584775"/>
+          </a:xfrm>
+          <a:prstGeom prst="rect">
+            <a:avLst/>
+          </a:prstGeom>
+          <a:noFill/>
+        </p:spPr>
+        <p:txBody>
+          <a:bodyPr wrap="none" rtlCol="0">
+            <a:spAutoFit/>
+          </a:bodyPr>
+          <a:lstStyle/>
+          <a:p>
+            <a:r>
+              <a:rPr lang="en-US" sz="3200" dirty="0"/>
+              <a:t>Before we begin</a:t>
+            </a:r>
           </a:p>
         </p:txBody>
       </p:sp>
@@ -26189,6 +26194,15 @@
 </file>
 
 <file path=customXml/item1.xml><?xml version="1.0" encoding="utf-8"?>
+<?mso-contentType ?>
+<FormTemplates xmlns="http://schemas.microsoft.com/sharepoint/v3/contenttype/forms">
+  <Display>DocumentLibraryForm</Display>
+  <Edit>DocumentLibraryForm</Edit>
+  <New>DocumentLibraryForm</New>
+</FormTemplates>
+</file>
+
+<file path=customXml/item2.xml><?xml version="1.0" encoding="utf-8"?>
 <p:properties xmlns:p="http://schemas.microsoft.com/office/2006/metadata/properties" xmlns:xsi="http://www.w3.org/2001/XMLSchema-instance" xmlns:pc="http://schemas.microsoft.com/office/infopath/2007/PartnerControls">
   <documentManagement>
     <Background xmlns="71af3243-3dd4-4a8d-8c0d-dd76da1f02a5">false</Background>
@@ -26206,15 +26220,6 @@
     <MediaServiceKeyPoints xmlns="71af3243-3dd4-4a8d-8c0d-dd76da1f02a5" xsi:nil="true"/>
   </documentManagement>
 </p:properties>
-</file>
-
-<file path=customXml/item2.xml><?xml version="1.0" encoding="utf-8"?>
-<?mso-contentType ?>
-<FormTemplates xmlns="http://schemas.microsoft.com/sharepoint/v3/contenttype/forms">
-  <Display>DocumentLibraryForm</Display>
-  <Edit>DocumentLibraryForm</Edit>
-  <New>DocumentLibraryForm</New>
-</FormTemplates>
 </file>
 
 <file path=customXml/item3.xml><?xml version="1.0" encoding="utf-8"?>
@@ -26530,6 +26535,14 @@
 </file>
 
 <file path=customXml/itemProps1.xml><?xml version="1.0" encoding="utf-8"?>
+<ds:datastoreItem xmlns:ds="http://schemas.openxmlformats.org/officeDocument/2006/customXml" ds:itemID="{8451406B-581B-4C29-A833-E33D8A6AB075}">
+  <ds:schemaRefs>
+    <ds:schemaRef ds:uri="http://schemas.microsoft.com/sharepoint/v3/contenttype/forms"/>
+  </ds:schemaRefs>
+</ds:datastoreItem>
+</file>
+
+<file path=customXml/itemProps2.xml><?xml version="1.0" encoding="utf-8"?>
 <ds:datastoreItem xmlns:ds="http://schemas.openxmlformats.org/officeDocument/2006/customXml" ds:itemID="{0F65614A-92F9-4391-AC3D-F3F5B0704F99}">
   <ds:schemaRefs>
     <ds:schemaRef ds:uri="http://schemas.microsoft.com/office/2006/metadata/properties"/>
@@ -26537,14 +26550,6 @@
     <ds:schemaRef ds:uri="71af3243-3dd4-4a8d-8c0d-dd76da1f02a5"/>
     <ds:schemaRef ds:uri="http://schemas.microsoft.com/sharepoint/v3"/>
     <ds:schemaRef ds:uri="230e9df3-be65-4c73-a93b-d1236ebd677e"/>
-  </ds:schemaRefs>
-</ds:datastoreItem>
-</file>
-
-<file path=customXml/itemProps2.xml><?xml version="1.0" encoding="utf-8"?>
-<ds:datastoreItem xmlns:ds="http://schemas.openxmlformats.org/officeDocument/2006/customXml" ds:itemID="{8451406B-581B-4C29-A833-E33D8A6AB075}">
-  <ds:schemaRefs>
-    <ds:schemaRef ds:uri="http://schemas.microsoft.com/sharepoint/v3/contenttype/forms"/>
   </ds:schemaRefs>
 </ds:datastoreItem>
 </file>

</xml_diff>